<commit_message>
Modification in the cover
</commit_message>
<xml_diff>
--- a/Tesis_mas_resumen/Plantilla_tapa/Versiones/Tapa_dura/17X24 PLANTILLA MANDAR TAPA DURA BUENA_version_2.pptx
+++ b/Tesis_mas_resumen/Plantilla_tapa/Versiones/Tapa_dura/17X24 PLANTILLA MANDAR TAPA DURA BUENA_version_2.pptx
@@ -34,7 +34,7 @@
       </p:grpSpPr>
       <p:sp>
         <p:nvSpPr>
-          <p:cNvPr id="38" name="PlaceHolder 1"/>
+          <p:cNvPr id="36" name="PlaceHolder 1"/>
           <p:cNvSpPr>
             <a:spLocks noGrp="1"/>
           </p:cNvSpPr>
@@ -69,7 +69,7 @@
       </p:sp>
       <p:sp>
         <p:nvSpPr>
-          <p:cNvPr id="39" name="PlaceHolder 2"/>
+          <p:cNvPr id="37" name="PlaceHolder 2"/>
           <p:cNvSpPr>
             <a:spLocks noGrp="1"/>
           </p:cNvSpPr>
@@ -93,79 +93,7 @@
               <a:rPr b="0" lang="es-ES" sz="2000" spc="-1" strike="noStrike">
                 <a:latin typeface="Arial"/>
               </a:rPr>
-              <a:t>Pulse </a:t>
-            </a:r>
-            <a:r>
-              <a:rPr b="0" lang="es-ES" sz="2000" spc="-1" strike="noStrike">
-                <a:latin typeface="Arial"/>
-              </a:rPr>
-              <a:t>par</a:t>
-            </a:r>
-            <a:r>
-              <a:rPr b="0" lang="es-ES" sz="2000" spc="-1" strike="noStrike">
-                <a:latin typeface="Arial"/>
-              </a:rPr>
-              <a:t>a </a:t>
-            </a:r>
-            <a:r>
-              <a:rPr b="0" lang="es-ES" sz="2000" spc="-1" strike="noStrike">
-                <a:latin typeface="Arial"/>
-              </a:rPr>
-              <a:t>edit</a:t>
-            </a:r>
-            <a:r>
-              <a:rPr b="0" lang="es-ES" sz="2000" spc="-1" strike="noStrike">
-                <a:latin typeface="Arial"/>
-              </a:rPr>
-              <a:t>ar </a:t>
-            </a:r>
-            <a:r>
-              <a:rPr b="0" lang="es-ES" sz="2000" spc="-1" strike="noStrike">
-                <a:latin typeface="Arial"/>
-              </a:rPr>
-              <a:t>el </a:t>
-            </a:r>
-            <a:r>
-              <a:rPr b="0" lang="es-ES" sz="2000" spc="-1" strike="noStrike">
-                <a:latin typeface="Arial"/>
-              </a:rPr>
-              <a:t>for</a:t>
-            </a:r>
-            <a:r>
-              <a:rPr b="0" lang="es-ES" sz="2000" spc="-1" strike="noStrike">
-                <a:latin typeface="Arial"/>
-              </a:rPr>
-              <a:t>mat</a:t>
-            </a:r>
-            <a:r>
-              <a:rPr b="0" lang="es-ES" sz="2000" spc="-1" strike="noStrike">
-                <a:latin typeface="Arial"/>
-              </a:rPr>
-              <a:t>o </a:t>
-            </a:r>
-            <a:r>
-              <a:rPr b="0" lang="es-ES" sz="2000" spc="-1" strike="noStrike">
-                <a:latin typeface="Arial"/>
-              </a:rPr>
-              <a:t>de </a:t>
-            </a:r>
-            <a:r>
-              <a:rPr b="0" lang="es-ES" sz="2000" spc="-1" strike="noStrike">
-                <a:latin typeface="Arial"/>
-              </a:rPr>
-              <a:t>las </a:t>
-            </a:r>
-            <a:r>
-              <a:rPr b="0" lang="es-ES" sz="2000" spc="-1" strike="noStrike">
-                <a:latin typeface="Arial"/>
-              </a:rPr>
-              <a:t>not</a:t>
-            </a:r>
-            <a:r>
-              <a:rPr b="0" lang="es-ES" sz="2000" spc="-1" strike="noStrike">
-                <a:latin typeface="Arial"/>
-              </a:rPr>
-              <a:t>as</a:t>
+              <a:t>Pulse para editar el formato de las notas</a:t>
             </a:r>
             <a:endParaRPr b="0" lang="es-ES" sz="2000" spc="-1" strike="noStrike">
               <a:latin typeface="Arial"/>
@@ -175,7 +103,7 @@
       </p:sp>
       <p:sp>
         <p:nvSpPr>
-          <p:cNvPr id="40" name="PlaceHolder 3"/>
+          <p:cNvPr id="38" name="PlaceHolder 3"/>
           <p:cNvSpPr>
             <a:spLocks noGrp="1"/>
           </p:cNvSpPr>
@@ -199,7 +127,7 @@
               <a:rPr b="0" lang="es-ES" sz="1400" spc="-1" strike="noStrike">
                 <a:latin typeface="Times New Roman"/>
               </a:rPr>
-              <a:t> </a:t>
+              <a:t>&lt;cabecera&gt;</a:t>
             </a:r>
             <a:endParaRPr b="0" lang="es-ES" sz="1400" spc="-1" strike="noStrike">
               <a:latin typeface="Times New Roman"/>
@@ -209,7 +137,7 @@
       </p:sp>
       <p:sp>
         <p:nvSpPr>
-          <p:cNvPr id="41" name="PlaceHolder 4"/>
+          <p:cNvPr id="39" name="PlaceHolder 4"/>
           <p:cNvSpPr>
             <a:spLocks noGrp="1"/>
           </p:cNvSpPr>
@@ -234,7 +162,7 @@
               <a:rPr b="0" lang="es-ES" sz="1400" spc="-1" strike="noStrike">
                 <a:latin typeface="Times New Roman"/>
               </a:rPr>
-              <a:t> </a:t>
+              <a:t>&lt;fecha/hora&gt;</a:t>
             </a:r>
             <a:endParaRPr b="0" lang="es-ES" sz="1400" spc="-1" strike="noStrike">
               <a:latin typeface="Times New Roman"/>
@@ -244,7 +172,7 @@
       </p:sp>
       <p:sp>
         <p:nvSpPr>
-          <p:cNvPr id="42" name="PlaceHolder 5"/>
+          <p:cNvPr id="40" name="PlaceHolder 5"/>
           <p:cNvSpPr>
             <a:spLocks noGrp="1"/>
           </p:cNvSpPr>
@@ -268,7 +196,7 @@
               <a:rPr b="0" lang="es-ES" sz="1400" spc="-1" strike="noStrike">
                 <a:latin typeface="Times New Roman"/>
               </a:rPr>
-              <a:t> </a:t>
+              <a:t>&lt;pie de página&gt;</a:t>
             </a:r>
             <a:endParaRPr b="0" lang="es-ES" sz="1400" spc="-1" strike="noStrike">
               <a:latin typeface="Times New Roman"/>
@@ -278,7 +206,7 @@
       </p:sp>
       <p:sp>
         <p:nvSpPr>
-          <p:cNvPr id="43" name="PlaceHolder 6"/>
+          <p:cNvPr id="41" name="PlaceHolder 6"/>
           <p:cNvSpPr>
             <a:spLocks noGrp="1"/>
           </p:cNvSpPr>
@@ -299,11 +227,11 @@
           <a:bodyPr lIns="0" rIns="0" tIns="0" bIns="0" anchor="b"/>
           <a:p>
             <a:pPr algn="r"/>
-            <a:fld id="{30C49B2D-48FC-44B4-A5F1-EA2A4C231530}" type="slidenum">
+            <a:fld id="{28E3E4B4-4D89-48DC-B4E0-DDADC9427B69}" type="slidenum">
               <a:rPr b="0" lang="es-ES" sz="1400" spc="-1" strike="noStrike">
                 <a:latin typeface="Times New Roman"/>
               </a:rPr>
-              <a:t>1</a:t>
+              <a:t>&lt;número&gt;</a:t>
             </a:fld>
             <a:endParaRPr b="0" lang="es-ES" sz="1400" spc="-1" strike="noStrike">
               <a:latin typeface="Times New Roman"/>
@@ -336,7 +264,7 @@
       </p:grpSpPr>
       <p:sp>
         <p:nvSpPr>
-          <p:cNvPr id="64" name="PlaceHolder 1"/>
+          <p:cNvPr id="62" name="PlaceHolder 1"/>
           <p:cNvSpPr>
             <a:spLocks noGrp="1"/>
           </p:cNvSpPr>
@@ -347,16 +275,16 @@
         <p:spPr>
           <a:xfrm>
             <a:off x="3181320" y="512640"/>
-            <a:ext cx="3618360" cy="2559600"/>
-          </a:xfrm>
-          <a:prstGeom prst="rect">
-            <a:avLst/>
-          </a:prstGeom>
-        </p:spPr>
-      </p:sp>
-      <p:sp>
-        <p:nvSpPr>
-          <p:cNvPr id="65" name="PlaceHolder 2"/>
+            <a:ext cx="3618000" cy="2559240"/>
+          </a:xfrm>
+          <a:prstGeom prst="rect">
+            <a:avLst/>
+          </a:prstGeom>
+        </p:spPr>
+      </p:sp>
+      <p:sp>
+        <p:nvSpPr>
+          <p:cNvPr id="63" name="PlaceHolder 2"/>
           <p:cNvSpPr>
             <a:spLocks noGrp="1"/>
           </p:cNvSpPr>
@@ -367,7 +295,7 @@
         <p:spPr>
           <a:xfrm>
             <a:off x="999000" y="3246480"/>
-            <a:ext cx="7981560" cy="3074040"/>
+            <a:ext cx="7981200" cy="3073680"/>
           </a:xfrm>
           <a:prstGeom prst="rect">
             <a:avLst/>
@@ -384,14 +312,14 @@
       </p:sp>
       <p:sp>
         <p:nvSpPr>
-          <p:cNvPr id="66" name="CustomShape 3"/>
+          <p:cNvPr id="64" name="CustomShape 3"/>
           <p:cNvSpPr/>
           <p:nvPr/>
         </p:nvSpPr>
         <p:spPr>
           <a:xfrm>
             <a:off x="5653800" y="6491880"/>
-            <a:ext cx="4321440" cy="339480"/>
+            <a:ext cx="4321080" cy="339120"/>
           </a:xfrm>
           <a:prstGeom prst="rect">
             <a:avLst/>
@@ -454,7 +382,7 @@
       </p:grpSpPr>
       <p:sp>
         <p:nvSpPr>
-          <p:cNvPr id="23" name="PlaceHolder 1"/>
+          <p:cNvPr id="21" name="PlaceHolder 1"/>
           <p:cNvSpPr>
             <a:spLocks noGrp="1"/>
           </p:cNvSpPr>
@@ -483,7 +411,7 @@
       </p:sp>
       <p:sp>
         <p:nvSpPr>
-          <p:cNvPr id="24" name="PlaceHolder 2"/>
+          <p:cNvPr id="22" name="PlaceHolder 2"/>
           <p:cNvSpPr>
             <a:spLocks noGrp="1"/>
           </p:cNvSpPr>
@@ -513,7 +441,7 @@
       </p:sp>
       <p:sp>
         <p:nvSpPr>
-          <p:cNvPr id="25" name="PlaceHolder 3"/>
+          <p:cNvPr id="23" name="PlaceHolder 3"/>
           <p:cNvSpPr>
             <a:spLocks noGrp="1"/>
           </p:cNvSpPr>
@@ -565,7 +493,7 @@
       </p:grpSpPr>
       <p:sp>
         <p:nvSpPr>
-          <p:cNvPr id="26" name="PlaceHolder 1"/>
+          <p:cNvPr id="24" name="PlaceHolder 1"/>
           <p:cNvSpPr>
             <a:spLocks noGrp="1"/>
           </p:cNvSpPr>
@@ -594,7 +522,7 @@
       </p:sp>
       <p:sp>
         <p:nvSpPr>
-          <p:cNvPr id="27" name="PlaceHolder 2"/>
+          <p:cNvPr id="25" name="PlaceHolder 2"/>
           <p:cNvSpPr>
             <a:spLocks noGrp="1"/>
           </p:cNvSpPr>
@@ -624,7 +552,7 @@
       </p:sp>
       <p:sp>
         <p:nvSpPr>
-          <p:cNvPr id="28" name="PlaceHolder 3"/>
+          <p:cNvPr id="26" name="PlaceHolder 3"/>
           <p:cNvSpPr>
             <a:spLocks noGrp="1"/>
           </p:cNvSpPr>
@@ -654,7 +582,7 @@
       </p:sp>
       <p:sp>
         <p:nvSpPr>
-          <p:cNvPr id="29" name="PlaceHolder 4"/>
+          <p:cNvPr id="27" name="PlaceHolder 4"/>
           <p:cNvSpPr>
             <a:spLocks noGrp="1"/>
           </p:cNvSpPr>
@@ -684,7 +612,7 @@
       </p:sp>
       <p:sp>
         <p:nvSpPr>
-          <p:cNvPr id="30" name="PlaceHolder 5"/>
+          <p:cNvPr id="28" name="PlaceHolder 5"/>
           <p:cNvSpPr>
             <a:spLocks noGrp="1"/>
           </p:cNvSpPr>
@@ -736,7 +664,7 @@
       </p:grpSpPr>
       <p:sp>
         <p:nvSpPr>
-          <p:cNvPr id="31" name="PlaceHolder 1"/>
+          <p:cNvPr id="29" name="PlaceHolder 1"/>
           <p:cNvSpPr>
             <a:spLocks noGrp="1"/>
           </p:cNvSpPr>
@@ -765,7 +693,7 @@
       </p:sp>
       <p:sp>
         <p:nvSpPr>
-          <p:cNvPr id="32" name="PlaceHolder 2"/>
+          <p:cNvPr id="30" name="PlaceHolder 2"/>
           <p:cNvSpPr>
             <a:spLocks noGrp="1"/>
           </p:cNvSpPr>
@@ -795,7 +723,7 @@
       </p:sp>
       <p:sp>
         <p:nvSpPr>
-          <p:cNvPr id="33" name="PlaceHolder 3"/>
+          <p:cNvPr id="31" name="PlaceHolder 3"/>
           <p:cNvSpPr>
             <a:spLocks noGrp="1"/>
           </p:cNvSpPr>
@@ -825,7 +753,7 @@
       </p:sp>
       <p:sp>
         <p:nvSpPr>
-          <p:cNvPr id="34" name="PlaceHolder 4"/>
+          <p:cNvPr id="32" name="PlaceHolder 4"/>
           <p:cNvSpPr>
             <a:spLocks noGrp="1"/>
           </p:cNvSpPr>
@@ -855,7 +783,7 @@
       </p:sp>
       <p:sp>
         <p:nvSpPr>
-          <p:cNvPr id="35" name="PlaceHolder 5"/>
+          <p:cNvPr id="33" name="PlaceHolder 5"/>
           <p:cNvSpPr>
             <a:spLocks noGrp="1"/>
           </p:cNvSpPr>
@@ -885,7 +813,7 @@
       </p:sp>
       <p:sp>
         <p:nvSpPr>
-          <p:cNvPr id="36" name="PlaceHolder 6"/>
+          <p:cNvPr id="34" name="PlaceHolder 6"/>
           <p:cNvSpPr>
             <a:spLocks noGrp="1"/>
           </p:cNvSpPr>
@@ -915,7 +843,7 @@
       </p:sp>
       <p:sp>
         <p:nvSpPr>
-          <p:cNvPr id="37" name="PlaceHolder 7"/>
+          <p:cNvPr id="35" name="PlaceHolder 7"/>
           <p:cNvSpPr>
             <a:spLocks noGrp="1"/>
           </p:cNvSpPr>
@@ -967,7 +895,7 @@
       </p:grpSpPr>
       <p:sp>
         <p:nvSpPr>
-          <p:cNvPr id="2" name="PlaceHolder 1"/>
+          <p:cNvPr id="0" name="PlaceHolder 1"/>
           <p:cNvSpPr>
             <a:spLocks noGrp="1"/>
           </p:cNvSpPr>
@@ -996,7 +924,7 @@
       </p:sp>
       <p:sp>
         <p:nvSpPr>
-          <p:cNvPr id="3" name="PlaceHolder 2"/>
+          <p:cNvPr id="1" name="PlaceHolder 2"/>
           <p:cNvSpPr>
             <a:spLocks noGrp="1"/>
           </p:cNvSpPr>
@@ -1047,7 +975,7 @@
       </p:grpSpPr>
       <p:sp>
         <p:nvSpPr>
-          <p:cNvPr id="4" name="PlaceHolder 1"/>
+          <p:cNvPr id="2" name="PlaceHolder 1"/>
           <p:cNvSpPr>
             <a:spLocks noGrp="1"/>
           </p:cNvSpPr>
@@ -1076,7 +1004,7 @@
       </p:sp>
       <p:sp>
         <p:nvSpPr>
-          <p:cNvPr id="5" name="PlaceHolder 2"/>
+          <p:cNvPr id="3" name="PlaceHolder 2"/>
           <p:cNvSpPr>
             <a:spLocks noGrp="1"/>
           </p:cNvSpPr>
@@ -1128,7 +1056,7 @@
       </p:grpSpPr>
       <p:sp>
         <p:nvSpPr>
-          <p:cNvPr id="6" name="PlaceHolder 1"/>
+          <p:cNvPr id="4" name="PlaceHolder 1"/>
           <p:cNvSpPr>
             <a:spLocks noGrp="1"/>
           </p:cNvSpPr>
@@ -1157,7 +1085,7 @@
       </p:sp>
       <p:sp>
         <p:nvSpPr>
-          <p:cNvPr id="7" name="PlaceHolder 2"/>
+          <p:cNvPr id="5" name="PlaceHolder 2"/>
           <p:cNvSpPr>
             <a:spLocks noGrp="1"/>
           </p:cNvSpPr>
@@ -1187,7 +1115,7 @@
       </p:sp>
       <p:sp>
         <p:nvSpPr>
-          <p:cNvPr id="8" name="PlaceHolder 3"/>
+          <p:cNvPr id="6" name="PlaceHolder 3"/>
           <p:cNvSpPr>
             <a:spLocks noGrp="1"/>
           </p:cNvSpPr>
@@ -1239,7 +1167,7 @@
       </p:grpSpPr>
       <p:sp>
         <p:nvSpPr>
-          <p:cNvPr id="9" name="PlaceHolder 1"/>
+          <p:cNvPr id="7" name="PlaceHolder 1"/>
           <p:cNvSpPr>
             <a:spLocks noGrp="1"/>
           </p:cNvSpPr>
@@ -1290,7 +1218,7 @@
       </p:grpSpPr>
       <p:sp>
         <p:nvSpPr>
-          <p:cNvPr id="10" name="PlaceHolder 1"/>
+          <p:cNvPr id="8" name="PlaceHolder 1"/>
           <p:cNvSpPr>
             <a:spLocks noGrp="1"/>
           </p:cNvSpPr>
@@ -1341,7 +1269,7 @@
       </p:grpSpPr>
       <p:sp>
         <p:nvSpPr>
-          <p:cNvPr id="11" name="PlaceHolder 1"/>
+          <p:cNvPr id="9" name="PlaceHolder 1"/>
           <p:cNvSpPr>
             <a:spLocks noGrp="1"/>
           </p:cNvSpPr>
@@ -1370,7 +1298,7 @@
       </p:sp>
       <p:sp>
         <p:nvSpPr>
-          <p:cNvPr id="12" name="PlaceHolder 2"/>
+          <p:cNvPr id="10" name="PlaceHolder 2"/>
           <p:cNvSpPr>
             <a:spLocks noGrp="1"/>
           </p:cNvSpPr>
@@ -1400,7 +1328,7 @@
       </p:sp>
       <p:sp>
         <p:nvSpPr>
-          <p:cNvPr id="13" name="PlaceHolder 3"/>
+          <p:cNvPr id="11" name="PlaceHolder 3"/>
           <p:cNvSpPr>
             <a:spLocks noGrp="1"/>
           </p:cNvSpPr>
@@ -1430,7 +1358,7 @@
       </p:sp>
       <p:sp>
         <p:nvSpPr>
-          <p:cNvPr id="14" name="PlaceHolder 4"/>
+          <p:cNvPr id="12" name="PlaceHolder 4"/>
           <p:cNvSpPr>
             <a:spLocks noGrp="1"/>
           </p:cNvSpPr>
@@ -1482,7 +1410,7 @@
       </p:grpSpPr>
       <p:sp>
         <p:nvSpPr>
-          <p:cNvPr id="15" name="PlaceHolder 1"/>
+          <p:cNvPr id="13" name="PlaceHolder 1"/>
           <p:cNvSpPr>
             <a:spLocks noGrp="1"/>
           </p:cNvSpPr>
@@ -1511,7 +1439,7 @@
       </p:sp>
       <p:sp>
         <p:nvSpPr>
-          <p:cNvPr id="16" name="PlaceHolder 2"/>
+          <p:cNvPr id="14" name="PlaceHolder 2"/>
           <p:cNvSpPr>
             <a:spLocks noGrp="1"/>
           </p:cNvSpPr>
@@ -1541,7 +1469,7 @@
       </p:sp>
       <p:sp>
         <p:nvSpPr>
-          <p:cNvPr id="17" name="PlaceHolder 3"/>
+          <p:cNvPr id="15" name="PlaceHolder 3"/>
           <p:cNvSpPr>
             <a:spLocks noGrp="1"/>
           </p:cNvSpPr>
@@ -1571,7 +1499,7 @@
       </p:sp>
       <p:sp>
         <p:nvSpPr>
-          <p:cNvPr id="18" name="PlaceHolder 4"/>
+          <p:cNvPr id="16" name="PlaceHolder 4"/>
           <p:cNvSpPr>
             <a:spLocks noGrp="1"/>
           </p:cNvSpPr>
@@ -1623,7 +1551,7 @@
       </p:grpSpPr>
       <p:sp>
         <p:nvSpPr>
-          <p:cNvPr id="19" name="PlaceHolder 1"/>
+          <p:cNvPr id="17" name="PlaceHolder 1"/>
           <p:cNvSpPr>
             <a:spLocks noGrp="1"/>
           </p:cNvSpPr>
@@ -1652,7 +1580,7 @@
       </p:sp>
       <p:sp>
         <p:nvSpPr>
-          <p:cNvPr id="20" name="PlaceHolder 2"/>
+          <p:cNvPr id="18" name="PlaceHolder 2"/>
           <p:cNvSpPr>
             <a:spLocks noGrp="1"/>
           </p:cNvSpPr>
@@ -1682,7 +1610,7 @@
       </p:sp>
       <p:sp>
         <p:nvSpPr>
-          <p:cNvPr id="21" name="PlaceHolder 3"/>
+          <p:cNvPr id="19" name="PlaceHolder 3"/>
           <p:cNvSpPr>
             <a:spLocks noGrp="1"/>
           </p:cNvSpPr>
@@ -1712,7 +1640,7 @@
       </p:sp>
       <p:sp>
         <p:nvSpPr>
-          <p:cNvPr id="22" name="PlaceHolder 4"/>
+          <p:cNvPr id="20" name="PlaceHolder 4"/>
           <p:cNvSpPr>
             <a:spLocks noGrp="1"/>
           </p:cNvSpPr>
@@ -1772,232 +1700,6 @@
           <a:chExt cx="0" cy="0"/>
         </a:xfrm>
       </p:grpSpPr>
-      <p:sp>
-        <p:nvSpPr>
-          <p:cNvPr id="0" name="PlaceHolder 1"/>
-          <p:cNvSpPr>
-            <a:spLocks noGrp="1"/>
-          </p:cNvSpPr>
-          <p:nvPr>
-            <p:ph type="title"/>
-          </p:nvPr>
-        </p:nvSpPr>
-        <p:spPr>
-          <a:xfrm>
-            <a:off x="755640" y="426240"/>
-            <a:ext cx="13606920" cy="1784880"/>
-          </a:xfrm>
-          <a:prstGeom prst="rect">
-            <a:avLst/>
-          </a:prstGeom>
-        </p:spPr>
-        <p:txBody>
-          <a:bodyPr lIns="0" rIns="0" tIns="0" bIns="0" anchor="ctr"/>
-          <a:p>
-            <a:pPr algn="ctr"/>
-            <a:r>
-              <a:rPr b="0" lang="es-ES" sz="4400" spc="-1" strike="noStrike">
-                <a:latin typeface="Arial"/>
-              </a:rPr>
-              <a:t>Pulse para editar el </a:t>
-            </a:r>
-            <a:r>
-              <a:rPr b="0" lang="es-ES" sz="4400" spc="-1" strike="noStrike">
-                <a:latin typeface="Arial"/>
-              </a:rPr>
-              <a:t>formato del texto de </a:t>
-            </a:r>
-            <a:r>
-              <a:rPr b="0" lang="es-ES" sz="4400" spc="-1" strike="noStrike">
-                <a:latin typeface="Arial"/>
-              </a:rPr>
-              <a:t>título</a:t>
-            </a:r>
-            <a:endParaRPr b="0" lang="es-ES" sz="4400" spc="-1" strike="noStrike">
-              <a:latin typeface="Arial"/>
-            </a:endParaRPr>
-          </a:p>
-        </p:txBody>
-      </p:sp>
-      <p:sp>
-        <p:nvSpPr>
-          <p:cNvPr id="1" name="PlaceHolder 2"/>
-          <p:cNvSpPr>
-            <a:spLocks noGrp="1"/>
-          </p:cNvSpPr>
-          <p:nvPr>
-            <p:ph type="body"/>
-          </p:nvPr>
-        </p:nvSpPr>
-        <p:spPr>
-          <a:xfrm>
-            <a:off x="755640" y="2501640"/>
-            <a:ext cx="13606920" cy="6200640"/>
-          </a:xfrm>
-          <a:prstGeom prst="rect">
-            <a:avLst/>
-          </a:prstGeom>
-        </p:spPr>
-        <p:txBody>
-          <a:bodyPr lIns="0" rIns="0" tIns="0" bIns="0">
-            <a:normAutofit/>
-          </a:bodyPr>
-          <a:p>
-            <a:pPr marL="432000" indent="-324000">
-              <a:spcBef>
-                <a:spcPts val="1417"/>
-              </a:spcBef>
-              <a:buClr>
-                <a:srgbClr val="000000"/>
-              </a:buClr>
-              <a:buSzPct val="45000"/>
-              <a:buFont typeface="Wingdings" charset="2"/>
-              <a:buChar char=""/>
-            </a:pPr>
-            <a:r>
-              <a:rPr b="0" lang="es-ES" sz="3200" spc="-1" strike="noStrike">
-                <a:latin typeface="Arial"/>
-              </a:rPr>
-              <a:t>Pulse para editar el formato de esquema del texto</a:t>
-            </a:r>
-            <a:endParaRPr b="0" lang="es-ES" sz="3200" spc="-1" strike="noStrike">
-              <a:latin typeface="Arial"/>
-            </a:endParaRPr>
-          </a:p>
-          <a:p>
-            <a:pPr lvl="1" marL="864000" indent="-324000">
-              <a:spcBef>
-                <a:spcPts val="1134"/>
-              </a:spcBef>
-              <a:buClr>
-                <a:srgbClr val="000000"/>
-              </a:buClr>
-              <a:buSzPct val="75000"/>
-              <a:buFont typeface="Symbol" charset="2"/>
-              <a:buChar char=""/>
-            </a:pPr>
-            <a:r>
-              <a:rPr b="0" lang="es-ES" sz="2800" spc="-1" strike="noStrike">
-                <a:latin typeface="Arial"/>
-              </a:rPr>
-              <a:t>Segundo nivel del esquema</a:t>
-            </a:r>
-            <a:endParaRPr b="0" lang="es-ES" sz="2800" spc="-1" strike="noStrike">
-              <a:latin typeface="Arial"/>
-            </a:endParaRPr>
-          </a:p>
-          <a:p>
-            <a:pPr lvl="2" marL="1296000" indent="-288000">
-              <a:spcBef>
-                <a:spcPts val="850"/>
-              </a:spcBef>
-              <a:buClr>
-                <a:srgbClr val="000000"/>
-              </a:buClr>
-              <a:buSzPct val="45000"/>
-              <a:buFont typeface="Wingdings" charset="2"/>
-              <a:buChar char=""/>
-            </a:pPr>
-            <a:r>
-              <a:rPr b="0" lang="es-ES" sz="2400" spc="-1" strike="noStrike">
-                <a:latin typeface="Arial"/>
-              </a:rPr>
-              <a:t>Tercer nivel del esquema</a:t>
-            </a:r>
-            <a:endParaRPr b="0" lang="es-ES" sz="2400" spc="-1" strike="noStrike">
-              <a:latin typeface="Arial"/>
-            </a:endParaRPr>
-          </a:p>
-          <a:p>
-            <a:pPr lvl="3" marL="1728000" indent="-216000">
-              <a:spcBef>
-                <a:spcPts val="567"/>
-              </a:spcBef>
-              <a:buClr>
-                <a:srgbClr val="000000"/>
-              </a:buClr>
-              <a:buSzPct val="75000"/>
-              <a:buFont typeface="Symbol" charset="2"/>
-              <a:buChar char=""/>
-            </a:pPr>
-            <a:r>
-              <a:rPr b="0" lang="es-ES" sz="2000" spc="-1" strike="noStrike">
-                <a:latin typeface="Arial"/>
-              </a:rPr>
-              <a:t>Cuarto nivel del esquema</a:t>
-            </a:r>
-            <a:endParaRPr b="0" lang="es-ES" sz="2000" spc="-1" strike="noStrike">
-              <a:latin typeface="Arial"/>
-            </a:endParaRPr>
-          </a:p>
-          <a:p>
-            <a:pPr lvl="4" marL="2160000" indent="-216000">
-              <a:spcBef>
-                <a:spcPts val="283"/>
-              </a:spcBef>
-              <a:buClr>
-                <a:srgbClr val="000000"/>
-              </a:buClr>
-              <a:buSzPct val="45000"/>
-              <a:buFont typeface="Wingdings" charset="2"/>
-              <a:buChar char=""/>
-            </a:pPr>
-            <a:r>
-              <a:rPr b="0" lang="es-ES" sz="2000" spc="-1" strike="noStrike">
-                <a:latin typeface="Arial"/>
-              </a:rPr>
-              <a:t>Quinto nivel del esquema</a:t>
-            </a:r>
-            <a:endParaRPr b="0" lang="es-ES" sz="2000" spc="-1" strike="noStrike">
-              <a:latin typeface="Arial"/>
-            </a:endParaRPr>
-          </a:p>
-          <a:p>
-            <a:pPr lvl="5" marL="2592000" indent="-216000">
-              <a:spcBef>
-                <a:spcPts val="283"/>
-              </a:spcBef>
-              <a:buClr>
-                <a:srgbClr val="000000"/>
-              </a:buClr>
-              <a:buSzPct val="45000"/>
-              <a:buFont typeface="Wingdings" charset="2"/>
-              <a:buChar char=""/>
-            </a:pPr>
-            <a:r>
-              <a:rPr b="0" lang="es-ES" sz="2000" spc="-1" strike="noStrike">
-                <a:latin typeface="Arial"/>
-              </a:rPr>
-              <a:t>Sexto nivel del esquema</a:t>
-            </a:r>
-            <a:endParaRPr b="0" lang="es-ES" sz="2000" spc="-1" strike="noStrike">
-              <a:latin typeface="Arial"/>
-            </a:endParaRPr>
-          </a:p>
-          <a:p>
-            <a:pPr lvl="6" marL="3024000" indent="-216000">
-              <a:spcBef>
-                <a:spcPts val="283"/>
-              </a:spcBef>
-              <a:buClr>
-                <a:srgbClr val="000000"/>
-              </a:buClr>
-              <a:buSzPct val="45000"/>
-              <a:buFont typeface="Wingdings" charset="2"/>
-              <a:buChar char=""/>
-            </a:pPr>
-            <a:r>
-              <a:rPr b="0" lang="es-ES" sz="2000" spc="-1" strike="noStrike">
-                <a:latin typeface="Arial"/>
-              </a:rPr>
-              <a:t>Séptimo nivel del esquema</a:t>
-            </a:r>
-            <a:endParaRPr b="0" lang="es-ES" sz="2000" spc="-1" strike="noStrike">
-              <a:latin typeface="Arial"/>
-            </a:endParaRPr>
-          </a:p>
-        </p:txBody>
-      </p:sp>
     </p:spTree>
   </p:cSld>
   <p:clrMap bg1="lt1" bg2="lt2" tx1="dk1" tx2="dk2" accent1="accent1" accent2="accent2" accent3="accent3" accent4="accent4" accent5="accent5" accent6="accent6" hlink="hlink" folHlink="folHlink"/>
@@ -2044,14 +1746,14 @@
       </p:grpSpPr>
       <p:sp>
         <p:nvSpPr>
-          <p:cNvPr id="44" name="CustomShape 1"/>
+          <p:cNvPr id="42" name="CustomShape 1"/>
           <p:cNvSpPr/>
           <p:nvPr/>
         </p:nvSpPr>
         <p:spPr>
           <a:xfrm>
             <a:off x="0" y="3960"/>
-            <a:ext cx="15120720" cy="10687680"/>
+            <a:ext cx="15120360" cy="10687320"/>
           </a:xfrm>
           <a:prstGeom prst="rect">
             <a:avLst/>
@@ -2085,28 +1787,28 @@
       </p:sp>
       <p:grpSp>
         <p:nvGrpSpPr>
-          <p:cNvPr id="45" name="Group 2"/>
+          <p:cNvPr id="43" name="Group 2"/>
           <p:cNvGrpSpPr/>
           <p:nvPr/>
         </p:nvGrpSpPr>
         <p:grpSpPr>
           <a:xfrm>
             <a:off x="577080" y="918720"/>
-            <a:ext cx="6478200" cy="8998200"/>
+            <a:ext cx="6477840" cy="8997840"/>
             <a:chOff x="577080" y="918720"/>
-            <a:chExt cx="6478200" cy="8998200"/>
+            <a:chExt cx="6477840" cy="8997840"/>
           </a:xfrm>
         </p:grpSpPr>
         <p:sp>
           <p:nvSpPr>
-            <p:cNvPr id="46" name="CustomShape 3"/>
+            <p:cNvPr id="44" name="CustomShape 3"/>
             <p:cNvSpPr/>
             <p:nvPr/>
           </p:nvSpPr>
           <p:spPr>
             <a:xfrm>
               <a:off x="577080" y="918720"/>
-              <a:ext cx="6120720" cy="8998200"/>
+              <a:ext cx="6120360" cy="8997840"/>
             </a:xfrm>
             <a:prstGeom prst="rect">
               <a:avLst/>
@@ -2127,14 +1829,14 @@
         </p:sp>
         <p:sp>
           <p:nvSpPr>
-            <p:cNvPr id="47" name="CustomShape 4"/>
+            <p:cNvPr id="45" name="CustomShape 4"/>
             <p:cNvSpPr/>
             <p:nvPr/>
           </p:nvSpPr>
           <p:spPr>
             <a:xfrm>
               <a:off x="6709320" y="918720"/>
-              <a:ext cx="345960" cy="8998200"/>
+              <a:ext cx="345600" cy="8997840"/>
             </a:xfrm>
             <a:prstGeom prst="rect">
               <a:avLst/>
@@ -2156,14 +1858,14 @@
       </p:grpSp>
       <p:sp>
         <p:nvSpPr>
-          <p:cNvPr id="48" name="CustomShape 5"/>
+          <p:cNvPr id="46" name="CustomShape 5"/>
           <p:cNvSpPr/>
           <p:nvPr/>
         </p:nvSpPr>
         <p:spPr>
           <a:xfrm>
             <a:off x="7057080" y="10136520"/>
-            <a:ext cx="898200" cy="536760"/>
+            <a:ext cx="897840" cy="536400"/>
           </a:xfrm>
           <a:prstGeom prst="rect">
             <a:avLst/>
@@ -2184,14 +1886,14 @@
       </p:sp>
       <p:sp>
         <p:nvSpPr>
-          <p:cNvPr id="49" name="CustomShape 6"/>
+          <p:cNvPr id="47" name="CustomShape 6"/>
           <p:cNvSpPr/>
           <p:nvPr/>
         </p:nvSpPr>
         <p:spPr>
           <a:xfrm>
             <a:off x="7057080" y="918720"/>
-            <a:ext cx="898200" cy="8998200"/>
+            <a:ext cx="897840" cy="8997840"/>
           </a:xfrm>
           <a:prstGeom prst="rect">
             <a:avLst/>
@@ -2212,28 +1914,28 @@
       </p:sp>
       <p:grpSp>
         <p:nvGrpSpPr>
-          <p:cNvPr id="50" name="Group 7"/>
+          <p:cNvPr id="48" name="Group 7"/>
           <p:cNvGrpSpPr/>
           <p:nvPr/>
         </p:nvGrpSpPr>
         <p:grpSpPr>
           <a:xfrm>
             <a:off x="7974360" y="917640"/>
-            <a:ext cx="6487560" cy="8999280"/>
+            <a:ext cx="6487200" cy="8998920"/>
             <a:chOff x="7974360" y="917640"/>
-            <a:chExt cx="6487560" cy="8999280"/>
+            <a:chExt cx="6487200" cy="8998920"/>
           </a:xfrm>
         </p:grpSpPr>
         <p:sp>
           <p:nvSpPr>
-            <p:cNvPr id="51" name="CustomShape 8"/>
+            <p:cNvPr id="49" name="CustomShape 8"/>
             <p:cNvSpPr/>
             <p:nvPr/>
           </p:nvSpPr>
           <p:spPr>
             <a:xfrm>
               <a:off x="8307720" y="918720"/>
-              <a:ext cx="6154200" cy="8998200"/>
+              <a:ext cx="6153840" cy="8997840"/>
             </a:xfrm>
             <a:prstGeom prst="rect">
               <a:avLst/>
@@ -2254,14 +1956,14 @@
         </p:sp>
         <p:sp>
           <p:nvSpPr>
-            <p:cNvPr id="52" name="CustomShape 9"/>
+            <p:cNvPr id="50" name="CustomShape 9"/>
             <p:cNvSpPr/>
             <p:nvPr/>
           </p:nvSpPr>
           <p:spPr>
             <a:xfrm>
               <a:off x="7974360" y="917640"/>
-              <a:ext cx="347400" cy="8998200"/>
+              <a:ext cx="347040" cy="8997840"/>
             </a:xfrm>
             <a:prstGeom prst="rect">
               <a:avLst/>
@@ -2283,19 +1985,19 @@
       </p:grpSp>
       <p:pic>
         <p:nvPicPr>
-          <p:cNvPr id="53" name="Picture 26" descr=""/>
+          <p:cNvPr id="51" name="Picture 26" descr=""/>
           <p:cNvPicPr/>
           <p:nvPr/>
         </p:nvPicPr>
         <p:blipFill>
           <a:blip r:embed="rId1"/>
-          <a:srcRect l="0" t="0" r="0" b="25345"/>
+          <a:srcRect l="0" t="0" r="0" b="25342"/>
           <a:stretch/>
         </p:blipFill>
         <p:spPr>
           <a:xfrm>
             <a:off x="-793080" y="6329520"/>
-            <a:ext cx="4898880" cy="4911480"/>
+            <a:ext cx="4898520" cy="4911120"/>
           </a:xfrm>
           <a:prstGeom prst="rect">
             <a:avLst/>
@@ -2307,14 +2009,14 @@
       </p:pic>
       <p:sp>
         <p:nvSpPr>
-          <p:cNvPr id="54" name="CustomShape 10"/>
+          <p:cNvPr id="52" name="CustomShape 10"/>
           <p:cNvSpPr/>
           <p:nvPr/>
         </p:nvSpPr>
         <p:spPr>
           <a:xfrm>
             <a:off x="7057080" y="0"/>
-            <a:ext cx="898200" cy="718200"/>
+            <a:ext cx="897840" cy="717840"/>
           </a:xfrm>
           <a:prstGeom prst="rect">
             <a:avLst/>
@@ -2335,7 +2037,7 @@
       </p:sp>
       <p:pic>
         <p:nvPicPr>
-          <p:cNvPr id="55" name="Imagen 17" descr=""/>
+          <p:cNvPr id="53" name="Imagen 17" descr=""/>
           <p:cNvPicPr/>
           <p:nvPr/>
         </p:nvPicPr>
@@ -2346,7 +2048,7 @@
         <p:spPr>
           <a:xfrm>
             <a:off x="615600" y="1775520"/>
-            <a:ext cx="6058800" cy="458280"/>
+            <a:ext cx="6058440" cy="457920"/>
           </a:xfrm>
           <a:prstGeom prst="rect">
             <a:avLst/>
@@ -2358,7 +2060,7 @@
       </p:pic>
       <p:pic>
         <p:nvPicPr>
-          <p:cNvPr id="56" name="Imagen 18" descr=""/>
+          <p:cNvPr id="54" name="Imagen 18" descr=""/>
           <p:cNvPicPr/>
           <p:nvPr/>
         </p:nvPicPr>
@@ -2369,7 +2071,7 @@
         <p:spPr>
           <a:xfrm>
             <a:off x="8444160" y="3060000"/>
-            <a:ext cx="6058800" cy="458280"/>
+            <a:ext cx="6058440" cy="457920"/>
           </a:xfrm>
           <a:prstGeom prst="rect">
             <a:avLst/>
@@ -2381,14 +2083,14 @@
       </p:pic>
       <p:sp>
         <p:nvSpPr>
-          <p:cNvPr id="57" name="CustomShape 11"/>
+          <p:cNvPr id="55" name="CustomShape 11"/>
           <p:cNvSpPr/>
           <p:nvPr/>
         </p:nvSpPr>
         <p:spPr>
           <a:xfrm>
             <a:off x="8322840" y="4062600"/>
-            <a:ext cx="6139080" cy="1392840"/>
+            <a:ext cx="6138720" cy="1392480"/>
           </a:xfrm>
           <a:prstGeom prst="rect">
             <a:avLst/>
@@ -2460,14 +2162,14 @@
       </p:sp>
       <p:sp>
         <p:nvSpPr>
-          <p:cNvPr id="58" name="CustomShape 12"/>
+          <p:cNvPr id="56" name="CustomShape 12"/>
           <p:cNvSpPr/>
           <p:nvPr/>
         </p:nvSpPr>
         <p:spPr>
           <a:xfrm>
             <a:off x="8520120" y="6418080"/>
-            <a:ext cx="5688720" cy="1392840"/>
+            <a:ext cx="5688360" cy="1392480"/>
           </a:xfrm>
           <a:prstGeom prst="rect">
             <a:avLst/>
@@ -2539,7 +2241,7 @@
                 <a:latin typeface="Arial"/>
                 <a:ea typeface="MS PGothic"/>
               </a:rPr>
-              <a:t>Valencia, July 2022</a:t>
+              <a:t>26th July 2022</a:t>
             </a:r>
             <a:endParaRPr b="0" lang="es-ES" sz="1800" spc="-1" strike="noStrike">
               <a:latin typeface="Arial"/>
@@ -2549,14 +2251,14 @@
       </p:sp>
       <p:sp>
         <p:nvSpPr>
-          <p:cNvPr id="59" name="CustomShape 13"/>
+          <p:cNvPr id="57" name="CustomShape 13"/>
           <p:cNvSpPr/>
           <p:nvPr/>
         </p:nvSpPr>
         <p:spPr>
           <a:xfrm>
             <a:off x="8414280" y="8578080"/>
-            <a:ext cx="6046920" cy="1392840"/>
+            <a:ext cx="6046560" cy="1392480"/>
           </a:xfrm>
           <a:prstGeom prst="rect">
             <a:avLst/>
@@ -2638,7 +2340,7 @@
       </p:sp>
       <p:pic>
         <p:nvPicPr>
-          <p:cNvPr id="60" name="Imagen 7" descr=""/>
+          <p:cNvPr id="58" name="Imagen 7" descr=""/>
           <p:cNvPicPr/>
           <p:nvPr/>
         </p:nvPicPr>
@@ -2649,7 +2351,7 @@
         <p:spPr>
           <a:xfrm>
             <a:off x="864000" y="2916000"/>
-            <a:ext cx="5565960" cy="3041640"/>
+            <a:ext cx="5565600" cy="3041280"/>
           </a:xfrm>
           <a:prstGeom prst="rect">
             <a:avLst/>
@@ -2661,14 +2363,14 @@
       </p:pic>
       <p:sp>
         <p:nvSpPr>
-          <p:cNvPr id="61" name="CustomShape 14"/>
+          <p:cNvPr id="59" name="CustomShape 14"/>
           <p:cNvSpPr/>
           <p:nvPr/>
         </p:nvSpPr>
         <p:spPr>
           <a:xfrm rot="21597600">
             <a:off x="8323200" y="2851920"/>
-            <a:ext cx="6139080" cy="1392840"/>
+            <a:ext cx="6138720" cy="1392480"/>
           </a:xfrm>
           <a:prstGeom prst="rect">
             <a:avLst/>
@@ -2710,14 +2412,14 @@
       </p:sp>
       <p:sp>
         <p:nvSpPr>
-          <p:cNvPr id="62" name="CustomShape 15"/>
+          <p:cNvPr id="60" name="CustomShape 15"/>
           <p:cNvSpPr/>
           <p:nvPr/>
         </p:nvSpPr>
         <p:spPr>
           <a:xfrm>
             <a:off x="9278280" y="3456360"/>
-            <a:ext cx="5550120" cy="372240"/>
+            <a:ext cx="5549760" cy="371880"/>
           </a:xfrm>
           <a:prstGeom prst="rect">
             <a:avLst/>
@@ -2759,19 +2461,19 @@
       </p:sp>
       <p:pic>
         <p:nvPicPr>
-          <p:cNvPr id="63" name="Picture 26" descr=""/>
+          <p:cNvPr id="61" name="Picture 26" descr=""/>
           <p:cNvPicPr/>
           <p:nvPr/>
         </p:nvPicPr>
         <p:blipFill>
           <a:blip r:embed="rId5"/>
-          <a:srcRect l="0" t="0" r="0" b="25363"/>
+          <a:srcRect l="0" t="0" r="0" b="25360"/>
           <a:stretch/>
         </p:blipFill>
         <p:spPr>
           <a:xfrm>
             <a:off x="10754640" y="1688760"/>
-            <a:ext cx="1242360" cy="1246320"/>
+            <a:ext cx="1242000" cy="1245960"/>
           </a:xfrm>
           <a:prstGeom prst="rect">
             <a:avLst/>

</xml_diff>